<commit_message>
polished, ready for test_red_methods
</commit_message>
<xml_diff>
--- a/extras/test_red_methods_example_plots.pptx
+++ b/extras/test_red_methods_example_plots.pptx
@@ -15,16 +15,18 @@
     <p:sldId id="264" r:id="rId9"/>
     <p:sldId id="265" r:id="rId10"/>
     <p:sldId id="266" r:id="rId11"/>
-    <p:sldId id="270" r:id="rId12"/>
-    <p:sldId id="257" r:id="rId13"/>
-    <p:sldId id="267" r:id="rId14"/>
-    <p:sldId id="271" r:id="rId15"/>
-    <p:sldId id="268" r:id="rId16"/>
-    <p:sldId id="272" r:id="rId17"/>
-    <p:sldId id="273" r:id="rId18"/>
-    <p:sldId id="274" r:id="rId19"/>
-    <p:sldId id="275" r:id="rId20"/>
-    <p:sldId id="276" r:id="rId21"/>
+    <p:sldId id="277" r:id="rId12"/>
+    <p:sldId id="270" r:id="rId13"/>
+    <p:sldId id="257" r:id="rId14"/>
+    <p:sldId id="267" r:id="rId15"/>
+    <p:sldId id="271" r:id="rId16"/>
+    <p:sldId id="268" r:id="rId17"/>
+    <p:sldId id="272" r:id="rId18"/>
+    <p:sldId id="273" r:id="rId19"/>
+    <p:sldId id="274" r:id="rId20"/>
+    <p:sldId id="275" r:id="rId21"/>
+    <p:sldId id="276" r:id="rId22"/>
+    <p:sldId id="278" r:id="rId23"/>
   </p:sldIdLst>
   <p:sldSz cx="12192000" cy="6858000"/>
   <p:notesSz cx="6858000" cy="9144000"/>
@@ -123,6 +125,11 @@
       </a:defRPr>
     </a:lvl9pPr>
   </p:defaultTextStyle>
+  <p:extLst>
+    <p:ext uri="{EFAFB233-063F-42B5-8137-9DF3F51BA10A}">
+      <p15:sldGuideLst xmlns:p15="http://schemas.microsoft.com/office/powerpoint/2012/main"/>
+    </p:ext>
+  </p:extLst>
 </p:presentation>
 </file>
 
@@ -273,7 +280,7 @@
           <a:p>
             <a:fld id="{164AD7BD-D422-43CA-8047-E873E549E653}" type="datetimeFigureOut">
               <a:rPr lang="en-US" smtClean="0"/>
-              <a:t>11/29/2021</a:t>
+              <a:t>11/30/2021</a:t>
             </a:fld>
             <a:endParaRPr lang="en-US"/>
           </a:p>
@@ -471,7 +478,7 @@
           <a:p>
             <a:fld id="{164AD7BD-D422-43CA-8047-E873E549E653}" type="datetimeFigureOut">
               <a:rPr lang="en-US" smtClean="0"/>
-              <a:t>11/29/2021</a:t>
+              <a:t>11/30/2021</a:t>
             </a:fld>
             <a:endParaRPr lang="en-US"/>
           </a:p>
@@ -679,7 +686,7 @@
           <a:p>
             <a:fld id="{164AD7BD-D422-43CA-8047-E873E549E653}" type="datetimeFigureOut">
               <a:rPr lang="en-US" smtClean="0"/>
-              <a:t>11/29/2021</a:t>
+              <a:t>11/30/2021</a:t>
             </a:fld>
             <a:endParaRPr lang="en-US"/>
           </a:p>
@@ -877,7 +884,7 @@
           <a:p>
             <a:fld id="{164AD7BD-D422-43CA-8047-E873E549E653}" type="datetimeFigureOut">
               <a:rPr lang="en-US" smtClean="0"/>
-              <a:t>11/29/2021</a:t>
+              <a:t>11/30/2021</a:t>
             </a:fld>
             <a:endParaRPr lang="en-US"/>
           </a:p>
@@ -1152,7 +1159,7 @@
           <a:p>
             <a:fld id="{164AD7BD-D422-43CA-8047-E873E549E653}" type="datetimeFigureOut">
               <a:rPr lang="en-US" smtClean="0"/>
-              <a:t>11/29/2021</a:t>
+              <a:t>11/30/2021</a:t>
             </a:fld>
             <a:endParaRPr lang="en-US"/>
           </a:p>
@@ -1417,7 +1424,7 @@
           <a:p>
             <a:fld id="{164AD7BD-D422-43CA-8047-E873E549E653}" type="datetimeFigureOut">
               <a:rPr lang="en-US" smtClean="0"/>
-              <a:t>11/29/2021</a:t>
+              <a:t>11/30/2021</a:t>
             </a:fld>
             <a:endParaRPr lang="en-US"/>
           </a:p>
@@ -1829,7 +1836,7 @@
           <a:p>
             <a:fld id="{164AD7BD-D422-43CA-8047-E873E549E653}" type="datetimeFigureOut">
               <a:rPr lang="en-US" smtClean="0"/>
-              <a:t>11/29/2021</a:t>
+              <a:t>11/30/2021</a:t>
             </a:fld>
             <a:endParaRPr lang="en-US"/>
           </a:p>
@@ -1970,7 +1977,7 @@
           <a:p>
             <a:fld id="{164AD7BD-D422-43CA-8047-E873E549E653}" type="datetimeFigureOut">
               <a:rPr lang="en-US" smtClean="0"/>
-              <a:t>11/29/2021</a:t>
+              <a:t>11/30/2021</a:t>
             </a:fld>
             <a:endParaRPr lang="en-US"/>
           </a:p>
@@ -2083,7 +2090,7 @@
           <a:p>
             <a:fld id="{164AD7BD-D422-43CA-8047-E873E549E653}" type="datetimeFigureOut">
               <a:rPr lang="en-US" smtClean="0"/>
-              <a:t>11/29/2021</a:t>
+              <a:t>11/30/2021</a:t>
             </a:fld>
             <a:endParaRPr lang="en-US"/>
           </a:p>
@@ -2394,7 +2401,7 @@
           <a:p>
             <a:fld id="{164AD7BD-D422-43CA-8047-E873E549E653}" type="datetimeFigureOut">
               <a:rPr lang="en-US" smtClean="0"/>
-              <a:t>11/29/2021</a:t>
+              <a:t>11/30/2021</a:t>
             </a:fld>
             <a:endParaRPr lang="en-US"/>
           </a:p>
@@ -2682,7 +2689,7 @@
           <a:p>
             <a:fld id="{164AD7BD-D422-43CA-8047-E873E549E653}" type="datetimeFigureOut">
               <a:rPr lang="en-US" smtClean="0"/>
-              <a:t>11/29/2021</a:t>
+              <a:t>11/30/2021</a:t>
             </a:fld>
             <a:endParaRPr lang="en-US"/>
           </a:p>
@@ -2923,7 +2930,7 @@
           <a:p>
             <a:fld id="{164AD7BD-D422-43CA-8047-E873E549E653}" type="datetimeFigureOut">
               <a:rPr lang="en-US" smtClean="0"/>
-              <a:t>11/29/2021</a:t>
+              <a:t>11/30/2021</a:t>
             </a:fld>
             <a:endParaRPr lang="en-US"/>
           </a:p>
@@ -3464,6 +3471,72 @@
           <a:chExt cx="0" cy="0"/>
         </a:xfrm>
       </p:grpSpPr>
+      <p:pic>
+        <p:nvPicPr>
+          <p:cNvPr id="4" name="Picture 3" descr="A picture containing square&#10;&#10;Description automatically generated">
+            <a:extLst>
+              <a:ext uri="{FF2B5EF4-FFF2-40B4-BE49-F238E27FC236}">
+                <a16:creationId xmlns:a16="http://schemas.microsoft.com/office/drawing/2014/main" id="{CAB1AA38-FA35-4BB8-8A44-B7F8B16F19ED}"/>
+              </a:ext>
+            </a:extLst>
+          </p:cNvPr>
+          <p:cNvPicPr>
+            <a:picLocks noChangeAspect="1"/>
+          </p:cNvPicPr>
+          <p:nvPr/>
+        </p:nvPicPr>
+        <p:blipFill>
+          <a:blip r:embed="rId2">
+            <a:extLst>
+              <a:ext uri="{28A0092B-C50C-407E-A947-70E740481C1C}">
+                <a14:useLocalDpi xmlns:a14="http://schemas.microsoft.com/office/drawing/2010/main" val="0"/>
+              </a:ext>
+            </a:extLst>
+          </a:blip>
+          <a:stretch>
+            <a:fillRect/>
+          </a:stretch>
+        </p:blipFill>
+        <p:spPr>
+          <a:xfrm>
+            <a:off x="854191" y="0"/>
+            <a:ext cx="10483617" cy="6858000"/>
+          </a:xfrm>
+          <a:prstGeom prst="rect">
+            <a:avLst/>
+          </a:prstGeom>
+        </p:spPr>
+      </p:pic>
+    </p:spTree>
+    <p:extLst>
+      <p:ext uri="{BB962C8B-B14F-4D97-AF65-F5344CB8AC3E}">
+        <p14:creationId xmlns:p14="http://schemas.microsoft.com/office/powerpoint/2010/main" val="3456040265"/>
+      </p:ext>
+    </p:extLst>
+  </p:cSld>
+  <p:clrMapOvr>
+    <a:masterClrMapping/>
+  </p:clrMapOvr>
+</p:sld>
+</file>
+
+<file path=ppt/slides/slide12.xml><?xml version="1.0" encoding="utf-8"?>
+<p:sld xmlns:a="http://schemas.openxmlformats.org/drawingml/2006/main" xmlns:r="http://schemas.openxmlformats.org/officeDocument/2006/relationships" xmlns:p="http://schemas.openxmlformats.org/presentationml/2006/main">
+  <p:cSld>
+    <p:spTree>
+      <p:nvGrpSpPr>
+        <p:cNvPr id="1" name=""/>
+        <p:cNvGrpSpPr/>
+        <p:nvPr/>
+      </p:nvGrpSpPr>
+      <p:grpSpPr>
+        <a:xfrm>
+          <a:off x="0" y="0"/>
+          <a:ext cx="0" cy="0"/>
+          <a:chOff x="0" y="0"/>
+          <a:chExt cx="0" cy="0"/>
+        </a:xfrm>
+      </p:grpSpPr>
       <p:sp>
         <p:nvSpPr>
           <p:cNvPr id="2" name="Title 1">
@@ -3505,7 +3578,7 @@
 </p:sld>
 </file>
 
-<file path=ppt/slides/slide12.xml><?xml version="1.0" encoding="utf-8"?>
+<file path=ppt/slides/slide13.xml><?xml version="1.0" encoding="utf-8"?>
 <p:sld xmlns:a="http://schemas.openxmlformats.org/drawingml/2006/main" xmlns:r="http://schemas.openxmlformats.org/officeDocument/2006/relationships" xmlns:p="http://schemas.openxmlformats.org/presentationml/2006/main">
   <p:cSld>
     <p:spTree>
@@ -3565,7 +3638,7 @@
 </p:sld>
 </file>
 
-<file path=ppt/slides/slide13.xml><?xml version="1.0" encoding="utf-8"?>
+<file path=ppt/slides/slide14.xml><?xml version="1.0" encoding="utf-8"?>
 <p:sld xmlns:a="http://schemas.openxmlformats.org/drawingml/2006/main" xmlns:r="http://schemas.openxmlformats.org/officeDocument/2006/relationships" xmlns:p="http://schemas.openxmlformats.org/presentationml/2006/main">
   <p:cSld>
     <p:spTree>
@@ -3631,7 +3704,7 @@
 </p:sld>
 </file>
 
-<file path=ppt/slides/slide14.xml><?xml version="1.0" encoding="utf-8"?>
+<file path=ppt/slides/slide15.xml><?xml version="1.0" encoding="utf-8"?>
 <p:sld xmlns:a="http://schemas.openxmlformats.org/drawingml/2006/main" xmlns:r="http://schemas.openxmlformats.org/officeDocument/2006/relationships" xmlns:p="http://schemas.openxmlformats.org/presentationml/2006/main">
   <p:cSld>
     <p:spTree>
@@ -3697,7 +3770,7 @@
 </p:sld>
 </file>
 
-<file path=ppt/slides/slide15.xml><?xml version="1.0" encoding="utf-8"?>
+<file path=ppt/slides/slide16.xml><?xml version="1.0" encoding="utf-8"?>
 <p:sld xmlns:a="http://schemas.openxmlformats.org/drawingml/2006/main" xmlns:r="http://schemas.openxmlformats.org/officeDocument/2006/relationships" xmlns:p="http://schemas.openxmlformats.org/presentationml/2006/main">
   <p:cSld>
     <p:spTree>
@@ -3763,7 +3836,7 @@
 </p:sld>
 </file>
 
-<file path=ppt/slides/slide16.xml><?xml version="1.0" encoding="utf-8"?>
+<file path=ppt/slides/slide17.xml><?xml version="1.0" encoding="utf-8"?>
 <p:sld xmlns:a="http://schemas.openxmlformats.org/drawingml/2006/main" xmlns:r="http://schemas.openxmlformats.org/officeDocument/2006/relationships" xmlns:p="http://schemas.openxmlformats.org/presentationml/2006/main">
   <p:cSld>
     <p:spTree>
@@ -3829,7 +3902,7 @@
 </p:sld>
 </file>
 
-<file path=ppt/slides/slide17.xml><?xml version="1.0" encoding="utf-8"?>
+<file path=ppt/slides/slide18.xml><?xml version="1.0" encoding="utf-8"?>
 <p:sld xmlns:a="http://schemas.openxmlformats.org/drawingml/2006/main" xmlns:r="http://schemas.openxmlformats.org/officeDocument/2006/relationships" xmlns:p="http://schemas.openxmlformats.org/presentationml/2006/main">
   <p:cSld>
     <p:spTree>
@@ -3895,7 +3968,7 @@
 </p:sld>
 </file>
 
-<file path=ppt/slides/slide18.xml><?xml version="1.0" encoding="utf-8"?>
+<file path=ppt/slides/slide19.xml><?xml version="1.0" encoding="utf-8"?>
 <p:sld xmlns:a="http://schemas.openxmlformats.org/drawingml/2006/main" xmlns:r="http://schemas.openxmlformats.org/officeDocument/2006/relationships" xmlns:p="http://schemas.openxmlformats.org/presentationml/2006/main">
   <p:cSld>
     <p:spTree>
@@ -3952,72 +4025,6 @@
     <p:extLst>
       <p:ext uri="{BB962C8B-B14F-4D97-AF65-F5344CB8AC3E}">
         <p14:creationId xmlns:p14="http://schemas.microsoft.com/office/powerpoint/2010/main" val="3426445118"/>
-      </p:ext>
-    </p:extLst>
-  </p:cSld>
-  <p:clrMapOvr>
-    <a:masterClrMapping/>
-  </p:clrMapOvr>
-</p:sld>
-</file>
-
-<file path=ppt/slides/slide19.xml><?xml version="1.0" encoding="utf-8"?>
-<p:sld xmlns:a="http://schemas.openxmlformats.org/drawingml/2006/main" xmlns:r="http://schemas.openxmlformats.org/officeDocument/2006/relationships" xmlns:p="http://schemas.openxmlformats.org/presentationml/2006/main">
-  <p:cSld>
-    <p:spTree>
-      <p:nvGrpSpPr>
-        <p:cNvPr id="1" name=""/>
-        <p:cNvGrpSpPr/>
-        <p:nvPr/>
-      </p:nvGrpSpPr>
-      <p:grpSpPr>
-        <a:xfrm>
-          <a:off x="0" y="0"/>
-          <a:ext cx="0" cy="0"/>
-          <a:chOff x="0" y="0"/>
-          <a:chExt cx="0" cy="0"/>
-        </a:xfrm>
-      </p:grpSpPr>
-      <p:pic>
-        <p:nvPicPr>
-          <p:cNvPr id="3" name="Picture 2" descr="Chart&#10;&#10;Description automatically generated">
-            <a:extLst>
-              <a:ext uri="{FF2B5EF4-FFF2-40B4-BE49-F238E27FC236}">
-                <a16:creationId xmlns:a16="http://schemas.microsoft.com/office/drawing/2014/main" id="{B18B13D5-9468-4BDC-879D-687D77CF679B}"/>
-              </a:ext>
-            </a:extLst>
-          </p:cNvPr>
-          <p:cNvPicPr>
-            <a:picLocks noChangeAspect="1"/>
-          </p:cNvPicPr>
-          <p:nvPr/>
-        </p:nvPicPr>
-        <p:blipFill>
-          <a:blip r:embed="rId2">
-            <a:extLst>
-              <a:ext uri="{28A0092B-C50C-407E-A947-70E740481C1C}">
-                <a14:useLocalDpi xmlns:a14="http://schemas.microsoft.com/office/drawing/2010/main" val="0"/>
-              </a:ext>
-            </a:extLst>
-          </a:blip>
-          <a:stretch>
-            <a:fillRect/>
-          </a:stretch>
-        </p:blipFill>
-        <p:spPr>
-          <a:xfrm>
-            <a:off x="931190" y="0"/>
-            <a:ext cx="10329620" cy="6858000"/>
-          </a:xfrm>
-          <a:prstGeom prst="rect">
-            <a:avLst/>
-          </a:prstGeom>
-        </p:spPr>
-      </p:pic>
-    </p:spTree>
-    <p:extLst>
-      <p:ext uri="{BB962C8B-B14F-4D97-AF65-F5344CB8AC3E}">
-        <p14:creationId xmlns:p14="http://schemas.microsoft.com/office/powerpoint/2010/main" val="2966896981"/>
       </p:ext>
     </p:extLst>
   </p:cSld>
@@ -4106,6 +4113,72 @@
       </p:grpSpPr>
       <p:pic>
         <p:nvPicPr>
+          <p:cNvPr id="3" name="Picture 2" descr="Chart&#10;&#10;Description automatically generated">
+            <a:extLst>
+              <a:ext uri="{FF2B5EF4-FFF2-40B4-BE49-F238E27FC236}">
+                <a16:creationId xmlns:a16="http://schemas.microsoft.com/office/drawing/2014/main" id="{B18B13D5-9468-4BDC-879D-687D77CF679B}"/>
+              </a:ext>
+            </a:extLst>
+          </p:cNvPr>
+          <p:cNvPicPr>
+            <a:picLocks noChangeAspect="1"/>
+          </p:cNvPicPr>
+          <p:nvPr/>
+        </p:nvPicPr>
+        <p:blipFill>
+          <a:blip r:embed="rId2">
+            <a:extLst>
+              <a:ext uri="{28A0092B-C50C-407E-A947-70E740481C1C}">
+                <a14:useLocalDpi xmlns:a14="http://schemas.microsoft.com/office/drawing/2010/main" val="0"/>
+              </a:ext>
+            </a:extLst>
+          </a:blip>
+          <a:stretch>
+            <a:fillRect/>
+          </a:stretch>
+        </p:blipFill>
+        <p:spPr>
+          <a:xfrm>
+            <a:off x="931190" y="0"/>
+            <a:ext cx="10329620" cy="6858000"/>
+          </a:xfrm>
+          <a:prstGeom prst="rect">
+            <a:avLst/>
+          </a:prstGeom>
+        </p:spPr>
+      </p:pic>
+    </p:spTree>
+    <p:extLst>
+      <p:ext uri="{BB962C8B-B14F-4D97-AF65-F5344CB8AC3E}">
+        <p14:creationId xmlns:p14="http://schemas.microsoft.com/office/powerpoint/2010/main" val="2966896981"/>
+      </p:ext>
+    </p:extLst>
+  </p:cSld>
+  <p:clrMapOvr>
+    <a:masterClrMapping/>
+  </p:clrMapOvr>
+</p:sld>
+</file>
+
+<file path=ppt/slides/slide21.xml><?xml version="1.0" encoding="utf-8"?>
+<p:sld xmlns:a="http://schemas.openxmlformats.org/drawingml/2006/main" xmlns:r="http://schemas.openxmlformats.org/officeDocument/2006/relationships" xmlns:p="http://schemas.openxmlformats.org/presentationml/2006/main">
+  <p:cSld>
+    <p:spTree>
+      <p:nvGrpSpPr>
+        <p:cNvPr id="1" name=""/>
+        <p:cNvGrpSpPr/>
+        <p:nvPr/>
+      </p:nvGrpSpPr>
+      <p:grpSpPr>
+        <a:xfrm>
+          <a:off x="0" y="0"/>
+          <a:ext cx="0" cy="0"/>
+          <a:chOff x="0" y="0"/>
+          <a:chExt cx="0" cy="0"/>
+        </a:xfrm>
+      </p:grpSpPr>
+      <p:pic>
+        <p:nvPicPr>
           <p:cNvPr id="4" name="Picture 3" descr="Chart, scatter chart&#10;&#10;Description automatically generated">
             <a:extLst>
               <a:ext uri="{FF2B5EF4-FFF2-40B4-BE49-F238E27FC236}">
@@ -4144,6 +4217,72 @@
     <p:extLst>
       <p:ext uri="{BB962C8B-B14F-4D97-AF65-F5344CB8AC3E}">
         <p14:creationId xmlns:p14="http://schemas.microsoft.com/office/powerpoint/2010/main" val="2279146983"/>
+      </p:ext>
+    </p:extLst>
+  </p:cSld>
+  <p:clrMapOvr>
+    <a:masterClrMapping/>
+  </p:clrMapOvr>
+</p:sld>
+</file>
+
+<file path=ppt/slides/slide22.xml><?xml version="1.0" encoding="utf-8"?>
+<p:sld xmlns:a="http://schemas.openxmlformats.org/drawingml/2006/main" xmlns:r="http://schemas.openxmlformats.org/officeDocument/2006/relationships" xmlns:p="http://schemas.openxmlformats.org/presentationml/2006/main">
+  <p:cSld>
+    <p:spTree>
+      <p:nvGrpSpPr>
+        <p:cNvPr id="1" name=""/>
+        <p:cNvGrpSpPr/>
+        <p:nvPr/>
+      </p:nvGrpSpPr>
+      <p:grpSpPr>
+        <a:xfrm>
+          <a:off x="0" y="0"/>
+          <a:ext cx="0" cy="0"/>
+          <a:chOff x="0" y="0"/>
+          <a:chExt cx="0" cy="0"/>
+        </a:xfrm>
+      </p:grpSpPr>
+      <p:pic>
+        <p:nvPicPr>
+          <p:cNvPr id="3" name="Picture 2" descr="Chart&#10;&#10;Description automatically generated">
+            <a:extLst>
+              <a:ext uri="{FF2B5EF4-FFF2-40B4-BE49-F238E27FC236}">
+                <a16:creationId xmlns:a16="http://schemas.microsoft.com/office/drawing/2014/main" id="{6A6BEC84-184E-4E2F-AF28-EA3FA3E3D21F}"/>
+              </a:ext>
+            </a:extLst>
+          </p:cNvPr>
+          <p:cNvPicPr>
+            <a:picLocks noChangeAspect="1"/>
+          </p:cNvPicPr>
+          <p:nvPr/>
+        </p:nvPicPr>
+        <p:blipFill>
+          <a:blip r:embed="rId2">
+            <a:extLst>
+              <a:ext uri="{28A0092B-C50C-407E-A947-70E740481C1C}">
+                <a14:useLocalDpi xmlns:a14="http://schemas.microsoft.com/office/drawing/2010/main" val="0"/>
+              </a:ext>
+            </a:extLst>
+          </a:blip>
+          <a:stretch>
+            <a:fillRect/>
+          </a:stretch>
+        </p:blipFill>
+        <p:spPr>
+          <a:xfrm>
+            <a:off x="931190" y="0"/>
+            <a:ext cx="10329620" cy="6858000"/>
+          </a:xfrm>
+          <a:prstGeom prst="rect">
+            <a:avLst/>
+          </a:prstGeom>
+        </p:spPr>
+      </p:pic>
+    </p:spTree>
+    <p:extLst>
+      <p:ext uri="{BB962C8B-B14F-4D97-AF65-F5344CB8AC3E}">
+        <p14:creationId xmlns:p14="http://schemas.microsoft.com/office/powerpoint/2010/main" val="2399574483"/>
       </p:ext>
     </p:extLst>
   </p:cSld>

</xml_diff>